<commit_message>
fix output format on approx
</commit_message>
<xml_diff>
--- a/approx_solution/presentation/approximation_presentation.pptx
+++ b/approx_solution/presentation/approximation_presentation.pptx
@@ -125,7 +125,7 @@
   <pc:docChgLst>
     <pc:chgData name="Luke Davis" userId="8f85ffe33d4baa21" providerId="LiveId" clId="{A8FC2011-CD90-4B49-A155-00C7FBC1E699}"/>
     <pc:docChg chg="undo custSel addSld modSld">
-      <pc:chgData name="Luke Davis" userId="8f85ffe33d4baa21" providerId="LiveId" clId="{A8FC2011-CD90-4B49-A155-00C7FBC1E699}" dt="2024-12-06T03:29:03.537" v="467" actId="1076"/>
+      <pc:chgData name="Luke Davis" userId="8f85ffe33d4baa21" providerId="LiveId" clId="{A8FC2011-CD90-4B49-A155-00C7FBC1E699}" dt="2024-12-06T13:36:45.571" v="486" actId="6549"/>
       <pc:docMkLst>
         <pc:docMk/>
       </pc:docMkLst>
@@ -316,7 +316,7 @@
         </pc:picChg>
       </pc:sldChg>
       <pc:sldChg chg="addSp delSp modSp add mod">
-        <pc:chgData name="Luke Davis" userId="8f85ffe33d4baa21" providerId="LiveId" clId="{A8FC2011-CD90-4B49-A155-00C7FBC1E699}" dt="2024-12-06T02:49:50.344" v="384" actId="1076"/>
+        <pc:chgData name="Luke Davis" userId="8f85ffe33d4baa21" providerId="LiveId" clId="{A8FC2011-CD90-4B49-A155-00C7FBC1E699}" dt="2024-12-06T13:36:26.822" v="481" actId="255"/>
         <pc:sldMkLst>
           <pc:docMk/>
           <pc:sldMk cId="1603588476" sldId="262"/>
@@ -338,7 +338,7 @@
           </ac:spMkLst>
         </pc:spChg>
         <pc:spChg chg="mod">
-          <ac:chgData name="Luke Davis" userId="8f85ffe33d4baa21" providerId="LiveId" clId="{A8FC2011-CD90-4B49-A155-00C7FBC1E699}" dt="2024-12-06T02:49:50.344" v="384" actId="1076"/>
+          <ac:chgData name="Luke Davis" userId="8f85ffe33d4baa21" providerId="LiveId" clId="{A8FC2011-CD90-4B49-A155-00C7FBC1E699}" dt="2024-12-06T13:36:26.822" v="481" actId="255"/>
           <ac:spMkLst>
             <pc:docMk/>
             <pc:sldMk cId="1603588476" sldId="262"/>
@@ -371,7 +371,7 @@
         </pc:picChg>
       </pc:sldChg>
       <pc:sldChg chg="addSp delSp modSp add mod">
-        <pc:chgData name="Luke Davis" userId="8f85ffe33d4baa21" providerId="LiveId" clId="{A8FC2011-CD90-4B49-A155-00C7FBC1E699}" dt="2024-12-06T02:54:56.886" v="398" actId="20577"/>
+        <pc:chgData name="Luke Davis" userId="8f85ffe33d4baa21" providerId="LiveId" clId="{A8FC2011-CD90-4B49-A155-00C7FBC1E699}" dt="2024-12-06T13:36:45.571" v="486" actId="6549"/>
         <pc:sldMkLst>
           <pc:docMk/>
           <pc:sldMk cId="1903942611" sldId="263"/>
@@ -393,7 +393,7 @@
           </ac:spMkLst>
         </pc:spChg>
         <pc:spChg chg="mod">
-          <ac:chgData name="Luke Davis" userId="8f85ffe33d4baa21" providerId="LiveId" clId="{A8FC2011-CD90-4B49-A155-00C7FBC1E699}" dt="2024-12-06T02:54:53.371" v="395"/>
+          <ac:chgData name="Luke Davis" userId="8f85ffe33d4baa21" providerId="LiveId" clId="{A8FC2011-CD90-4B49-A155-00C7FBC1E699}" dt="2024-12-06T13:36:45.571" v="486" actId="6549"/>
           <ac:spMkLst>
             <pc:docMk/>
             <pc:sldMk cId="1903942611" sldId="263"/>
@@ -703,7 +703,7 @@
           <a:p>
             <a:fld id="{85BF9358-3AEC-4E50-AD46-D7C937B91650}" type="datetimeFigureOut">
               <a:rPr lang="en-US" smtClean="0"/>
-              <a:t>12/5/2024</a:t>
+              <a:t>12/6/2024</a:t>
             </a:fld>
             <a:endParaRPr lang="en-US"/>
           </a:p>
@@ -911,7 +911,7 @@
           <a:p>
             <a:fld id="{85BF9358-3AEC-4E50-AD46-D7C937B91650}" type="datetimeFigureOut">
               <a:rPr lang="en-US" smtClean="0"/>
-              <a:t>12/5/2024</a:t>
+              <a:t>12/6/2024</a:t>
             </a:fld>
             <a:endParaRPr lang="en-US"/>
           </a:p>
@@ -1167,7 +1167,7 @@
           <a:p>
             <a:fld id="{85BF9358-3AEC-4E50-AD46-D7C937B91650}" type="datetimeFigureOut">
               <a:rPr lang="en-US" smtClean="0"/>
-              <a:t>12/5/2024</a:t>
+              <a:t>12/6/2024</a:t>
             </a:fld>
             <a:endParaRPr lang="en-US"/>
           </a:p>
@@ -1341,7 +1341,7 @@
           <a:p>
             <a:fld id="{85BF9358-3AEC-4E50-AD46-D7C937B91650}" type="datetimeFigureOut">
               <a:rPr lang="en-US" smtClean="0"/>
-              <a:t>12/5/2024</a:t>
+              <a:t>12/6/2024</a:t>
             </a:fld>
             <a:endParaRPr lang="en-US"/>
           </a:p>
@@ -1684,7 +1684,7 @@
           <a:p>
             <a:fld id="{85BF9358-3AEC-4E50-AD46-D7C937B91650}" type="datetimeFigureOut">
               <a:rPr lang="en-US" smtClean="0"/>
-              <a:t>12/5/2024</a:t>
+              <a:t>12/6/2024</a:t>
             </a:fld>
             <a:endParaRPr lang="en-US"/>
           </a:p>
@@ -1959,7 +1959,7 @@
           <a:p>
             <a:fld id="{85BF9358-3AEC-4E50-AD46-D7C937B91650}" type="datetimeFigureOut">
               <a:rPr lang="en-US" smtClean="0"/>
-              <a:t>12/5/2024</a:t>
+              <a:t>12/6/2024</a:t>
             </a:fld>
             <a:endParaRPr lang="en-US"/>
           </a:p>
@@ -2338,7 +2338,7 @@
           <a:p>
             <a:fld id="{85BF9358-3AEC-4E50-AD46-D7C937B91650}" type="datetimeFigureOut">
               <a:rPr lang="en-US" smtClean="0"/>
-              <a:t>12/5/2024</a:t>
+              <a:t>12/6/2024</a:t>
             </a:fld>
             <a:endParaRPr lang="en-US"/>
           </a:p>
@@ -2456,7 +2456,7 @@
           <a:p>
             <a:fld id="{85BF9358-3AEC-4E50-AD46-D7C937B91650}" type="datetimeFigureOut">
               <a:rPr lang="en-US" smtClean="0"/>
-              <a:t>12/5/2024</a:t>
+              <a:t>12/6/2024</a:t>
             </a:fld>
             <a:endParaRPr lang="en-US"/>
           </a:p>
@@ -2627,7 +2627,7 @@
           <a:p>
             <a:fld id="{85BF9358-3AEC-4E50-AD46-D7C937B91650}" type="datetimeFigureOut">
               <a:rPr lang="en-US" smtClean="0"/>
-              <a:t>12/5/2024</a:t>
+              <a:t>12/6/2024</a:t>
             </a:fld>
             <a:endParaRPr lang="en-US"/>
           </a:p>
@@ -2981,7 +2981,7 @@
           <a:p>
             <a:fld id="{85BF9358-3AEC-4E50-AD46-D7C937B91650}" type="datetimeFigureOut">
               <a:rPr lang="en-US" smtClean="0"/>
-              <a:t>12/5/2024</a:t>
+              <a:t>12/6/2024</a:t>
             </a:fld>
             <a:endParaRPr lang="en-US"/>
           </a:p>
@@ -3363,7 +3363,7 @@
           <a:p>
             <a:fld id="{85BF9358-3AEC-4E50-AD46-D7C937B91650}" type="datetimeFigureOut">
               <a:rPr lang="en-US" smtClean="0"/>
-              <a:t>12/5/2024</a:t>
+              <a:t>12/6/2024</a:t>
             </a:fld>
             <a:endParaRPr lang="en-US"/>
           </a:p>
@@ -3650,7 +3650,7 @@
           <a:p>
             <a:fld id="{85BF9358-3AEC-4E50-AD46-D7C937B91650}" type="datetimeFigureOut">
               <a:rPr lang="en-US" smtClean="0"/>
-              <a:t>12/5/2024</a:t>
+              <a:t>12/6/2024</a:t>
             </a:fld>
             <a:endParaRPr lang="en-US"/>
           </a:p>
@@ -5868,7 +5868,7 @@
         </p:spPr>
         <p:txBody>
           <a:bodyPr vert="horz" lIns="0" tIns="45720" rIns="0" bIns="45720" rtlCol="0">
-            <a:normAutofit lnSpcReduction="10000"/>
+            <a:noAutofit/>
           </a:bodyPr>
           <a:lstStyle>
             <a:lvl1pPr marL="91440" indent="-91440" algn="l" defTabSz="914400" rtl="0" eaLnBrk="1" latinLnBrk="0" hangingPunct="1">
@@ -6138,6 +6138,17 @@
               <a:t>{0, 1, 2}</a:t>
             </a:r>
           </a:p>
+          <a:p>
+            <a:pPr>
+              <a:lnSpc>
+                <a:spcPct val="100000"/>
+              </a:lnSpc>
+            </a:pPr>
+            <a:r>
+              <a:rPr lang="en-US" sz="3000" dirty="0"/>
+              <a:t>{3, 4, 5}</a:t>
+            </a:r>
+          </a:p>
         </p:txBody>
       </p:sp>
       <p:pic>
@@ -6340,7 +6351,7 @@
         </p:spPr>
         <p:txBody>
           <a:bodyPr vert="horz" lIns="0" tIns="45720" rIns="0" bIns="45720" rtlCol="0">
-            <a:normAutofit lnSpcReduction="10000"/>
+            <a:noAutofit/>
           </a:bodyPr>
           <a:lstStyle>
             <a:lvl1pPr marL="91440" indent="-91440" algn="l" defTabSz="914400" rtl="0" eaLnBrk="1" latinLnBrk="0" hangingPunct="1">
@@ -6609,6 +6620,34 @@
               <a:rPr lang="en-US" sz="3000" dirty="0"/>
               <a:t>{1, 2, 5, 6, 7, 8, 9}</a:t>
             </a:r>
+          </a:p>
+          <a:p>
+            <a:pPr>
+              <a:lnSpc>
+                <a:spcPct val="100000"/>
+              </a:lnSpc>
+            </a:pPr>
+            <a:r>
+              <a:rPr lang="en-US" sz="3000" b="0" i="0" u="none" strike="noStrike" dirty="0">
+                <a:solidFill>
+                  <a:srgbClr val="3F3F3F"/>
+                </a:solidFill>
+                <a:effectLst/>
+                <a:latin typeface="Calibri" panose="020F0502020204030204" pitchFamily="34" charset="0"/>
+              </a:rPr>
+              <a:t>{1, 3, 5, 6, 7, 8, </a:t>
+            </a:r>
+            <a:r>
+              <a:rPr lang="en-US" sz="3000" b="0" i="0" u="none" strike="noStrike">
+                <a:solidFill>
+                  <a:srgbClr val="3F3F3F"/>
+                </a:solidFill>
+                <a:effectLst/>
+                <a:latin typeface="Calibri" panose="020F0502020204030204" pitchFamily="34" charset="0"/>
+              </a:rPr>
+              <a:t>10}</a:t>
+            </a:r>
+            <a:endParaRPr lang="en-US" sz="3000" dirty="0"/>
           </a:p>
         </p:txBody>
       </p:sp>

</xml_diff>